<commit_message>
Update all files: modified, deleted, and new
</commit_message>
<xml_diff>
--- a/4_Manuscript/Burkitt_manuscript_figures.pptx
+++ b/4_Manuscript/Burkitt_manuscript_figures.pptx
@@ -108,6 +108,11 @@
       </a:defRPr>
     </a:lvl9pPr>
   </p:defaultTextStyle>
+  <p:extLst>
+    <p:ext uri="{EFAFB233-063F-42B5-8137-9DF3F51BA10A}">
+      <p15:sldGuideLst xmlns:p15="http://schemas.microsoft.com/office/powerpoint/2012/main"/>
+    </p:ext>
+  </p:extLst>
 </p:presentation>
 </file>
 
@@ -258,7 +263,7 @@
           <a:p>
             <a:fld id="{1C61071D-99EF-AC4A-9ACC-0A799097E21A}" type="datetimeFigureOut">
               <a:rPr lang="en-US" smtClean="0"/>
-              <a:t>6/19/25</a:t>
+              <a:t>7/4/25</a:t>
             </a:fld>
             <a:endParaRPr lang="en-US"/>
           </a:p>
@@ -456,7 +461,7 @@
           <a:p>
             <a:fld id="{1C61071D-99EF-AC4A-9ACC-0A799097E21A}" type="datetimeFigureOut">
               <a:rPr lang="en-US" smtClean="0"/>
-              <a:t>6/19/25</a:t>
+              <a:t>7/4/25</a:t>
             </a:fld>
             <a:endParaRPr lang="en-US"/>
           </a:p>
@@ -664,7 +669,7 @@
           <a:p>
             <a:fld id="{1C61071D-99EF-AC4A-9ACC-0A799097E21A}" type="datetimeFigureOut">
               <a:rPr lang="en-US" smtClean="0"/>
-              <a:t>6/19/25</a:t>
+              <a:t>7/4/25</a:t>
             </a:fld>
             <a:endParaRPr lang="en-US"/>
           </a:p>
@@ -862,7 +867,7 @@
           <a:p>
             <a:fld id="{1C61071D-99EF-AC4A-9ACC-0A799097E21A}" type="datetimeFigureOut">
               <a:rPr lang="en-US" smtClean="0"/>
-              <a:t>6/19/25</a:t>
+              <a:t>7/4/25</a:t>
             </a:fld>
             <a:endParaRPr lang="en-US"/>
           </a:p>
@@ -1137,7 +1142,7 @@
           <a:p>
             <a:fld id="{1C61071D-99EF-AC4A-9ACC-0A799097E21A}" type="datetimeFigureOut">
               <a:rPr lang="en-US" smtClean="0"/>
-              <a:t>6/19/25</a:t>
+              <a:t>7/4/25</a:t>
             </a:fld>
             <a:endParaRPr lang="en-US"/>
           </a:p>
@@ -1402,7 +1407,7 @@
           <a:p>
             <a:fld id="{1C61071D-99EF-AC4A-9ACC-0A799097E21A}" type="datetimeFigureOut">
               <a:rPr lang="en-US" smtClean="0"/>
-              <a:t>6/19/25</a:t>
+              <a:t>7/4/25</a:t>
             </a:fld>
             <a:endParaRPr lang="en-US"/>
           </a:p>
@@ -1814,7 +1819,7 @@
           <a:p>
             <a:fld id="{1C61071D-99EF-AC4A-9ACC-0A799097E21A}" type="datetimeFigureOut">
               <a:rPr lang="en-US" smtClean="0"/>
-              <a:t>6/19/25</a:t>
+              <a:t>7/4/25</a:t>
             </a:fld>
             <a:endParaRPr lang="en-US"/>
           </a:p>
@@ -1955,7 +1960,7 @@
           <a:p>
             <a:fld id="{1C61071D-99EF-AC4A-9ACC-0A799097E21A}" type="datetimeFigureOut">
               <a:rPr lang="en-US" smtClean="0"/>
-              <a:t>6/19/25</a:t>
+              <a:t>7/4/25</a:t>
             </a:fld>
             <a:endParaRPr lang="en-US"/>
           </a:p>
@@ -2068,7 +2073,7 @@
           <a:p>
             <a:fld id="{1C61071D-99EF-AC4A-9ACC-0A799097E21A}" type="datetimeFigureOut">
               <a:rPr lang="en-US" smtClean="0"/>
-              <a:t>6/19/25</a:t>
+              <a:t>7/4/25</a:t>
             </a:fld>
             <a:endParaRPr lang="en-US"/>
           </a:p>
@@ -2379,7 +2384,7 @@
           <a:p>
             <a:fld id="{1C61071D-99EF-AC4A-9ACC-0A799097E21A}" type="datetimeFigureOut">
               <a:rPr lang="en-US" smtClean="0"/>
-              <a:t>6/19/25</a:t>
+              <a:t>7/4/25</a:t>
             </a:fld>
             <a:endParaRPr lang="en-US"/>
           </a:p>
@@ -2667,7 +2672,7 @@
           <a:p>
             <a:fld id="{1C61071D-99EF-AC4A-9ACC-0A799097E21A}" type="datetimeFigureOut">
               <a:rPr lang="en-US" smtClean="0"/>
-              <a:t>6/19/25</a:t>
+              <a:t>7/4/25</a:t>
             </a:fld>
             <a:endParaRPr lang="en-US"/>
           </a:p>
@@ -2908,7 +2913,7 @@
           <a:p>
             <a:fld id="{1C61071D-99EF-AC4A-9ACC-0A799097E21A}" type="datetimeFigureOut">
               <a:rPr lang="en-US" smtClean="0"/>
-              <a:t>6/19/25</a:t>
+              <a:t>7/4/25</a:t>
             </a:fld>
             <a:endParaRPr lang="en-US"/>
           </a:p>
@@ -3339,7 +3344,7 @@
         </p:nvSpPr>
         <p:spPr>
           <a:xfrm>
-            <a:off x="330506" y="561860"/>
+            <a:off x="330506" y="396605"/>
             <a:ext cx="320922" cy="369332"/>
           </a:xfrm>
           <a:prstGeom prst="rect">
@@ -3374,7 +3379,7 @@
         </p:nvSpPr>
         <p:spPr>
           <a:xfrm>
-            <a:off x="8591320" y="561860"/>
+            <a:off x="8479220" y="396605"/>
             <a:ext cx="324128" cy="369332"/>
           </a:xfrm>
           <a:prstGeom prst="rect">
@@ -3409,7 +3414,7 @@
         </p:nvSpPr>
         <p:spPr>
           <a:xfrm>
-            <a:off x="330506" y="3434873"/>
+            <a:off x="330506" y="3082334"/>
             <a:ext cx="344966" cy="369332"/>
           </a:xfrm>
           <a:prstGeom prst="rect">
@@ -3432,10 +3437,10 @@
       </p:sp>
       <p:pic>
         <p:nvPicPr>
-          <p:cNvPr id="14" name="Picture 13">
-            <a:extLst>
-              <a:ext uri="{FF2B5EF4-FFF2-40B4-BE49-F238E27FC236}">
-                <a16:creationId xmlns:a16="http://schemas.microsoft.com/office/drawing/2014/main" id="{96E1C2CB-D615-81AB-023D-65D8C89A73E9}"/>
+          <p:cNvPr id="3" name="Picture 2">
+            <a:extLst>
+              <a:ext uri="{FF2B5EF4-FFF2-40B4-BE49-F238E27FC236}">
+                <a16:creationId xmlns:a16="http://schemas.microsoft.com/office/drawing/2014/main" id="{B40E41B9-AC1B-B04A-2560-74475F892C19}"/>
               </a:ext>
             </a:extLst>
           </p:cNvPr>
@@ -3446,15 +3451,15 @@
         </p:nvPicPr>
         <p:blipFill>
           <a:blip r:embed="rId2"/>
-          <a:srcRect l="4938" t="10945" r="4902" b="41176"/>
+          <a:srcRect r="69006"/>
           <a:stretch>
             <a:fillRect/>
           </a:stretch>
         </p:blipFill>
         <p:spPr>
           <a:xfrm>
-            <a:off x="807967" y="746526"/>
-            <a:ext cx="7007626" cy="2604911"/>
+            <a:off x="8916254" y="397049"/>
+            <a:ext cx="2860777" cy="6460951"/>
           </a:xfrm>
           <a:prstGeom prst="rect">
             <a:avLst/>
@@ -3463,10 +3468,10 @@
       </p:pic>
       <p:pic>
         <p:nvPicPr>
-          <p:cNvPr id="16" name="Picture 15">
-            <a:extLst>
-              <a:ext uri="{FF2B5EF4-FFF2-40B4-BE49-F238E27FC236}">
-                <a16:creationId xmlns:a16="http://schemas.microsoft.com/office/drawing/2014/main" id="{8CCF29DD-9223-9C9E-27CB-088222443C40}"/>
+          <p:cNvPr id="4" name="Picture 3">
+            <a:extLst>
+              <a:ext uri="{FF2B5EF4-FFF2-40B4-BE49-F238E27FC236}">
+                <a16:creationId xmlns:a16="http://schemas.microsoft.com/office/drawing/2014/main" id="{941DA276-FC7B-386F-D2C2-27BEF9AAB8B3}"/>
               </a:ext>
             </a:extLst>
           </p:cNvPr>
@@ -3477,21 +3482,157 @@
         </p:nvPicPr>
         <p:blipFill>
           <a:blip r:embed="rId3"/>
-          <a:srcRect r="70482"/>
+          <a:srcRect t="9877" b="41176"/>
           <a:stretch>
             <a:fillRect/>
           </a:stretch>
         </p:blipFill>
         <p:spPr>
           <a:xfrm>
-            <a:off x="8915448" y="561860"/>
-            <a:ext cx="2576336" cy="6109662"/>
+            <a:off x="596343" y="559237"/>
+            <a:ext cx="7772400" cy="2663063"/>
           </a:xfrm>
           <a:prstGeom prst="rect">
             <a:avLst/>
           </a:prstGeom>
         </p:spPr>
       </p:pic>
+      <p:grpSp>
+        <p:nvGrpSpPr>
+          <p:cNvPr id="13" name="Group 12">
+            <a:extLst>
+              <a:ext uri="{FF2B5EF4-FFF2-40B4-BE49-F238E27FC236}">
+                <a16:creationId xmlns:a16="http://schemas.microsoft.com/office/drawing/2014/main" id="{20712E0D-739B-19A0-3ACB-391FC9E43B9B}"/>
+              </a:ext>
+            </a:extLst>
+          </p:cNvPr>
+          <p:cNvGrpSpPr/>
+          <p:nvPr/>
+        </p:nvGrpSpPr>
+        <p:grpSpPr>
+          <a:xfrm>
+            <a:off x="596343" y="3449381"/>
+            <a:ext cx="7119785" cy="3408619"/>
+            <a:chOff x="596343" y="3449381"/>
+            <a:chExt cx="7119785" cy="3408619"/>
+          </a:xfrm>
+        </p:grpSpPr>
+        <p:pic>
+          <p:nvPicPr>
+            <p:cNvPr id="7" name="Picture 6">
+              <a:extLst>
+                <a:ext uri="{FF2B5EF4-FFF2-40B4-BE49-F238E27FC236}">
+                  <a16:creationId xmlns:a16="http://schemas.microsoft.com/office/drawing/2014/main" id="{35CAD03A-DF4C-F3C6-4086-A847E24FABE1}"/>
+                </a:ext>
+              </a:extLst>
+            </p:cNvPr>
+            <p:cNvPicPr>
+              <a:picLocks noChangeAspect="1"/>
+            </p:cNvPicPr>
+            <p:nvPr/>
+          </p:nvPicPr>
+          <p:blipFill>
+            <a:blip r:embed="rId4"/>
+            <a:stretch>
+              <a:fillRect/>
+            </a:stretch>
+          </p:blipFill>
+          <p:spPr>
+            <a:xfrm>
+              <a:off x="596343" y="3449381"/>
+              <a:ext cx="5681031" cy="3408619"/>
+            </a:xfrm>
+            <a:prstGeom prst="rect">
+              <a:avLst/>
+            </a:prstGeom>
+          </p:spPr>
+        </p:pic>
+        <p:pic>
+          <p:nvPicPr>
+            <p:cNvPr id="8" name="Picture 7">
+              <a:extLst>
+                <a:ext uri="{FF2B5EF4-FFF2-40B4-BE49-F238E27FC236}">
+                  <a16:creationId xmlns:a16="http://schemas.microsoft.com/office/drawing/2014/main" id="{9C2767BD-4318-94BD-3DDC-5DB66D50D179}"/>
+                </a:ext>
+              </a:extLst>
+            </p:cNvPr>
+            <p:cNvPicPr>
+              <a:picLocks noChangeAspect="1"/>
+            </p:cNvPicPr>
+            <p:nvPr/>
+          </p:nvPicPr>
+          <p:blipFill>
+            <a:blip r:embed="rId4"/>
+            <a:srcRect l="80129" t="7021" b="76202"/>
+            <a:stretch>
+              <a:fillRect/>
+            </a:stretch>
+          </p:blipFill>
+          <p:spPr>
+            <a:xfrm>
+              <a:off x="6096000" y="4745255"/>
+              <a:ext cx="1620128" cy="820660"/>
+            </a:xfrm>
+            <a:prstGeom prst="rect">
+              <a:avLst/>
+            </a:prstGeom>
+          </p:spPr>
+        </p:pic>
+        <p:sp>
+          <p:nvSpPr>
+            <p:cNvPr id="11" name="Rectangle 10">
+              <a:extLst>
+                <a:ext uri="{FF2B5EF4-FFF2-40B4-BE49-F238E27FC236}">
+                  <a16:creationId xmlns:a16="http://schemas.microsoft.com/office/drawing/2014/main" id="{02447037-6441-20EF-D6AB-E2B4FFC7080C}"/>
+                </a:ext>
+              </a:extLst>
+            </p:cNvPr>
+            <p:cNvSpPr/>
+            <p:nvPr/>
+          </p:nvSpPr>
+          <p:spPr>
+            <a:xfrm>
+              <a:off x="5155096" y="3451666"/>
+              <a:ext cx="1152939" cy="736021"/>
+            </a:xfrm>
+            <a:prstGeom prst="rect">
+              <a:avLst/>
+            </a:prstGeom>
+            <a:solidFill>
+              <a:schemeClr val="bg1"/>
+            </a:solidFill>
+            <a:ln>
+              <a:solidFill>
+                <a:schemeClr val="bg1"/>
+              </a:solidFill>
+            </a:ln>
+          </p:spPr>
+          <p:style>
+            <a:lnRef idx="2">
+              <a:schemeClr val="accent1">
+                <a:shade val="15000"/>
+              </a:schemeClr>
+            </a:lnRef>
+            <a:fillRef idx="1">
+              <a:schemeClr val="accent1"/>
+            </a:fillRef>
+            <a:effectRef idx="0">
+              <a:schemeClr val="accent1"/>
+            </a:effectRef>
+            <a:fontRef idx="minor">
+              <a:schemeClr val="lt1"/>
+            </a:fontRef>
+          </p:style>
+          <p:txBody>
+            <a:bodyPr rtlCol="0" anchor="ctr"/>
+            <a:lstStyle/>
+            <a:p>
+              <a:pPr algn="ctr"/>
+              <a:endParaRPr lang="en-US"/>
+            </a:p>
+          </p:txBody>
+        </p:sp>
+      </p:grpSp>
     </p:spTree>
     <p:extLst>
       <p:ext uri="{BB962C8B-B14F-4D97-AF65-F5344CB8AC3E}">

</xml_diff>